<commit_message>
PPT에 Usecase Diagram 추가
</commit_message>
<xml_diff>
--- a/SSACCER 발표자료 초안 (5.25 수정).pptx
+++ b/SSACCER 발표자료 초안 (5.25 수정).pptx
@@ -5,7 +5,7 @@
     <p:sldMasterId id="2147483816" r:id="rId1"/>
   </p:sldMasterIdLst>
   <p:notesMasterIdLst>
-    <p:notesMasterId r:id="rId13"/>
+    <p:notesMasterId r:id="rId14"/>
   </p:notesMasterIdLst>
   <p:sldIdLst>
     <p:sldId id="256" r:id="rId2"/>
@@ -19,6 +19,7 @@
     <p:sldId id="273" r:id="rId10"/>
     <p:sldId id="274" r:id="rId11"/>
     <p:sldId id="266" r:id="rId12"/>
+    <p:sldId id="275" r:id="rId13"/>
   </p:sldIdLst>
   <p:sldSz cx="9144000" cy="5715000" type="screen16x10"/>
   <p:notesSz cx="6858000" cy="9144000"/>
@@ -119,7 +120,7 @@
   </p:defaultTextStyle>
   <p:extLst>
     <p:ext uri="{EFAFB233-063F-42B5-8137-9DF3F51BA10A}">
-      <p15:sldGuideLst xmlns:p15="http://schemas.microsoft.com/office/powerpoint/2012/main">
+      <p15:sldGuideLst xmlns:p15="http://schemas.microsoft.com/office/powerpoint/2012/main" xmlns="">
         <p15:guide id="1" orient="horz" pos="1800">
           <p15:clr>
             <a:srgbClr val="A4A3A4"/>
@@ -133,7 +134,7 @@
       </p15:sldGuideLst>
     </p:ext>
     <p:ext uri="{2D200454-40CA-4A62-9FC3-DE9A4176ACB9}">
-      <p15:notesGuideLst xmlns:p15="http://schemas.microsoft.com/office/powerpoint/2012/main">
+      <p15:notesGuideLst xmlns:p15="http://schemas.microsoft.com/office/powerpoint/2012/main" xmlns="">
         <p15:guide id="1" orient="horz" pos="2880">
           <p15:clr>
             <a:srgbClr val="A4A3A4"/>
@@ -151,7 +152,7 @@
 </file>
 
 <file path=ppt/charts/chart1.xml><?xml version="1.0" encoding="utf-8"?>
-<c:chartSpace xmlns:c="http://schemas.openxmlformats.org/drawingml/2006/chart" xmlns:a="http://schemas.openxmlformats.org/drawingml/2006/main" xmlns:r="http://schemas.openxmlformats.org/officeDocument/2006/relationships" xmlns:c16r2="http://schemas.microsoft.com/office/drawing/2015/06/chart">
+<c:chartSpace xmlns:c="http://schemas.openxmlformats.org/drawingml/2006/chart" xmlns:a="http://schemas.openxmlformats.org/drawingml/2006/main" xmlns:r="http://schemas.openxmlformats.org/officeDocument/2006/relationships">
   <c:date1904 val="0"/>
   <c:lang val="ko-KR"/>
   <c:roundedCorners val="0"/>
@@ -200,7 +201,7 @@
               </a:ln>
               <a:effectLst/>
             </c:spPr>
-            <c:extLst>
+            <c:extLst xmlns:c16r2="http://schemas.microsoft.com/office/drawing/2015/06/chart">
               <c:ext xmlns:c16="http://schemas.microsoft.com/office/drawing/2014/chart" uri="{C3380CC4-5D6E-409C-BE32-E72D297353CC}">
                 <c16:uniqueId val="{00000001-A794-48CA-A46E-C271C87519C5}"/>
               </c:ext>
@@ -223,7 +224,7 @@
               </a:ln>
               <a:effectLst/>
             </c:spPr>
-            <c:extLst>
+            <c:extLst xmlns:c16r2="http://schemas.microsoft.com/office/drawing/2015/06/chart">
               <c:ext xmlns:c16="http://schemas.microsoft.com/office/drawing/2014/chart" uri="{C3380CC4-5D6E-409C-BE32-E72D297353CC}">
                 <c16:uniqueId val="{00000002-A794-48CA-A46E-C271C87519C5}"/>
               </c:ext>
@@ -283,7 +284,7 @@
               </c:numCache>
             </c:numRef>
           </c:val>
-          <c:extLst>
+          <c:extLst xmlns:c16r2="http://schemas.microsoft.com/office/drawing/2015/06/chart">
             <c:ext xmlns:c16="http://schemas.microsoft.com/office/drawing/2014/chart" uri="{C3380CC4-5D6E-409C-BE32-E72D297353CC}">
               <c16:uniqueId val="{00000000-A794-48CA-A46E-C271C87519C5}"/>
             </c:ext>
@@ -330,7 +331,7 @@
       <a:endParaRPr lang="ko-KR"/>
     </a:p>
   </c:txPr>
-  <c:externalData r:id="rId3">
+  <c:externalData r:id="rId1">
     <c:autoUpdate val="0"/>
   </c:externalData>
 </c:chartSpace>
@@ -4324,17 +4325,7 @@
                 <a:latin typeface="아리따-돋움4.0(OTF)-Bold" panose="02020603020101020101" pitchFamily="18" charset="-127"/>
                 <a:ea typeface="아리따-돋움4.0(OTF)-Bold" panose="02020603020101020101" pitchFamily="18" charset="-127"/>
               </a:rPr>
-              <a:t>Find </a:t>
-            </a:r>
-            <a:r>
-              <a:rPr lang="en-US" altLang="ko-KR" sz="2800" dirty="0" smtClean="0">
-                <a:solidFill>
-                  <a:schemeClr val="bg1"/>
-                </a:solidFill>
-                <a:latin typeface="아리따-돋움4.0(OTF)-Bold" panose="02020603020101020101" pitchFamily="18" charset="-127"/>
-                <a:ea typeface="아리따-돋움4.0(OTF)-Bold" panose="02020603020101020101" pitchFamily="18" charset="-127"/>
-              </a:rPr>
-              <a:t>Your</a:t>
+              <a:t>Find Your</a:t>
             </a:r>
             <a:r>
               <a:rPr lang="ko-KR" altLang="en-US" sz="2800" dirty="0" smtClean="0">
@@ -4556,21 +4547,7 @@
                 <a:latin typeface="아리따-돋움4.0(OTF)-Medium" pitchFamily="18" charset="-127"/>
                 <a:ea typeface="아리따-돋움4.0(OTF)-Medium" pitchFamily="18" charset="-127"/>
               </a:rPr>
-              <a:t> </a:t>
-            </a:r>
-            <a:r>
-              <a:rPr lang="ko-KR" altLang="en-US" sz="1600" dirty="0" smtClean="0">
-                <a:latin typeface="아리따-돋움4.0(OTF)-Medium" pitchFamily="18" charset="-127"/>
-                <a:ea typeface="아리따-돋움4.0(OTF)-Medium" pitchFamily="18" charset="-127"/>
-              </a:rPr>
-              <a:t>날씨 </a:t>
-            </a:r>
-            <a:r>
-              <a:rPr lang="ko-KR" altLang="en-US" sz="1600" dirty="0" smtClean="0">
-                <a:latin typeface="아리따-돋움4.0(OTF)-Medium" pitchFamily="18" charset="-127"/>
-                <a:ea typeface="아리따-돋움4.0(OTF)-Medium" pitchFamily="18" charset="-127"/>
-              </a:rPr>
-              <a:t>페이지</a:t>
+              <a:t> 날씨 페이지</a:t>
             </a:r>
             <a:endParaRPr lang="ko-KR" altLang="en-US" sz="1600" dirty="0">
               <a:latin typeface="아리따-돋움4.0(OTF)-Medium" pitchFamily="18" charset="-127"/>
@@ -6479,6 +6456,425 @@
 </p:sld>
 </file>
 
+<file path=ppt/slides/slide12.xml><?xml version="1.0" encoding="utf-8"?>
+<p:sld xmlns:a="http://schemas.openxmlformats.org/drawingml/2006/main" xmlns:r="http://schemas.openxmlformats.org/officeDocument/2006/relationships" xmlns:p="http://schemas.openxmlformats.org/presentationml/2006/main">
+  <p:cSld>
+    <p:spTree>
+      <p:nvGrpSpPr>
+        <p:cNvPr id="1" name=""/>
+        <p:cNvGrpSpPr/>
+        <p:nvPr/>
+      </p:nvGrpSpPr>
+      <p:grpSpPr>
+        <a:xfrm>
+          <a:off x="0" y="0"/>
+          <a:ext cx="0" cy="0"/>
+          <a:chOff x="0" y="0"/>
+          <a:chExt cx="0" cy="0"/>
+        </a:xfrm>
+      </p:grpSpPr>
+      <p:sp>
+        <p:nvSpPr>
+          <p:cNvPr id="4" name="슬라이드 번호 개체 틀 3"/>
+          <p:cNvSpPr>
+            <a:spLocks noGrp="1"/>
+          </p:cNvSpPr>
+          <p:nvPr>
+            <p:ph type="sldNum" sz="quarter" idx="12"/>
+          </p:nvPr>
+        </p:nvSpPr>
+        <p:spPr/>
+        <p:txBody>
+          <a:bodyPr/>
+          <a:lstStyle/>
+          <a:p>
+            <a:fld id="{F0815012-8A23-4E07-A901-D5F86A97F033}" type="slidenum">
+              <a:rPr lang="ko-KR" altLang="en-US" smtClean="0"/>
+              <a:pPr/>
+              <a:t>12</a:t>
+            </a:fld>
+            <a:endParaRPr lang="ko-KR" altLang="en-US" dirty="0"/>
+          </a:p>
+        </p:txBody>
+      </p:sp>
+      <p:sp>
+        <p:nvSpPr>
+          <p:cNvPr id="5" name="TextBox 4"/>
+          <p:cNvSpPr txBox="1"/>
+          <p:nvPr/>
+        </p:nvSpPr>
+        <p:spPr>
+          <a:xfrm>
+            <a:off x="323528" y="526437"/>
+            <a:ext cx="1728192" cy="523220"/>
+          </a:xfrm>
+          <a:prstGeom prst="rect">
+            <a:avLst/>
+          </a:prstGeom>
+          <a:noFill/>
+        </p:spPr>
+        <p:txBody>
+          <a:bodyPr wrap="square" rtlCol="0">
+            <a:spAutoFit/>
+          </a:bodyPr>
+          <a:lstStyle/>
+          <a:p>
+            <a:r>
+              <a:rPr lang="ko-KR" altLang="en-US" sz="2800" dirty="0" smtClean="0">
+                <a:latin typeface="아리따-돋움4.0(OTF)-Bold" pitchFamily="18" charset="-127"/>
+                <a:ea typeface="아리따-돋움4.0(OTF)-Bold" pitchFamily="18" charset="-127"/>
+              </a:rPr>
+              <a:t>별첨</a:t>
+            </a:r>
+            <a:r>
+              <a:rPr lang="en-US" altLang="ko-KR" sz="2800" dirty="0" smtClean="0">
+                <a:latin typeface="아리따-돋움4.0(OTF)-Bold" pitchFamily="18" charset="-127"/>
+                <a:ea typeface="아리따-돋움4.0(OTF)-Bold" pitchFamily="18" charset="-127"/>
+              </a:rPr>
+              <a:t>)</a:t>
+            </a:r>
+            <a:endParaRPr lang="ko-KR" altLang="en-US" sz="2800" dirty="0">
+              <a:latin typeface="아리따-돋움4.0(OTF)-Bold" pitchFamily="18" charset="-127"/>
+              <a:ea typeface="아리따-돋움4.0(OTF)-Bold" pitchFamily="18" charset="-127"/>
+            </a:endParaRPr>
+          </a:p>
+        </p:txBody>
+      </p:sp>
+      <p:sp>
+        <p:nvSpPr>
+          <p:cNvPr id="6" name="TextBox 5"/>
+          <p:cNvSpPr txBox="1"/>
+          <p:nvPr/>
+        </p:nvSpPr>
+        <p:spPr>
+          <a:xfrm>
+            <a:off x="467544" y="1035482"/>
+            <a:ext cx="4032448" cy="338554"/>
+          </a:xfrm>
+          <a:prstGeom prst="rect">
+            <a:avLst/>
+          </a:prstGeom>
+          <a:noFill/>
+        </p:spPr>
+        <p:txBody>
+          <a:bodyPr wrap="square" rtlCol="0">
+            <a:spAutoFit/>
+          </a:bodyPr>
+          <a:lstStyle/>
+          <a:p>
+            <a:r>
+              <a:rPr lang="ko-KR" altLang="en-US" sz="1600" dirty="0" err="1" smtClean="0">
+                <a:latin typeface="아리따-돋움4.0(OTF)-Medium" pitchFamily="18" charset="-127"/>
+                <a:ea typeface="아리따-돋움4.0(OTF)-Medium" pitchFamily="18" charset="-127"/>
+              </a:rPr>
+              <a:t>유스케이스</a:t>
+            </a:r>
+            <a:r>
+              <a:rPr lang="en-US" altLang="ko-KR" sz="1600" dirty="0" smtClean="0">
+                <a:latin typeface="아리따-돋움4.0(OTF)-Medium" pitchFamily="18" charset="-127"/>
+                <a:ea typeface="아리따-돋움4.0(OTF)-Medium" pitchFamily="18" charset="-127"/>
+              </a:rPr>
+              <a:t>(</a:t>
+            </a:r>
+            <a:r>
+              <a:rPr lang="en-US" altLang="ko-KR" sz="1600" dirty="0" err="1" smtClean="0">
+                <a:latin typeface="아리따-돋움4.0(OTF)-Medium" pitchFamily="18" charset="-127"/>
+                <a:ea typeface="아리따-돋움4.0(OTF)-Medium" pitchFamily="18" charset="-127"/>
+              </a:rPr>
+              <a:t>Usecase</a:t>
+            </a:r>
+            <a:r>
+              <a:rPr lang="en-US" altLang="ko-KR" sz="1600" dirty="0" smtClean="0">
+                <a:latin typeface="아리따-돋움4.0(OTF)-Medium" pitchFamily="18" charset="-127"/>
+                <a:ea typeface="아리따-돋움4.0(OTF)-Medium" pitchFamily="18" charset="-127"/>
+              </a:rPr>
+              <a:t>) </a:t>
+            </a:r>
+            <a:r>
+              <a:rPr lang="ko-KR" altLang="en-US" sz="1600" dirty="0" smtClean="0">
+                <a:latin typeface="아리따-돋움4.0(OTF)-Medium" pitchFamily="18" charset="-127"/>
+                <a:ea typeface="아리따-돋움4.0(OTF)-Medium" pitchFamily="18" charset="-127"/>
+              </a:rPr>
+              <a:t>다이어그램</a:t>
+            </a:r>
+            <a:endParaRPr lang="ko-KR" altLang="en-US" sz="1600" dirty="0">
+              <a:latin typeface="아리따-돋움4.0(OTF)-Medium" pitchFamily="18" charset="-127"/>
+              <a:ea typeface="아리따-돋움4.0(OTF)-Medium" pitchFamily="18" charset="-127"/>
+            </a:endParaRPr>
+          </a:p>
+        </p:txBody>
+      </p:sp>
+      <p:pic>
+        <p:nvPicPr>
+          <p:cNvPr id="1026" name="Picture 2"/>
+          <p:cNvPicPr>
+            <a:picLocks noChangeAspect="1" noChangeArrowheads="1"/>
+          </p:cNvPicPr>
+          <p:nvPr/>
+        </p:nvPicPr>
+        <p:blipFill>
+          <a:blip r:embed="rId2">
+            <a:extLst>
+              <a:ext uri="{28A0092B-C50C-407E-A947-70E740481C1C}">
+                <a14:useLocalDpi xmlns:a14="http://schemas.microsoft.com/office/drawing/2010/main" val="0"/>
+              </a:ext>
+            </a:extLst>
+          </a:blip>
+          <a:srcRect/>
+          <a:stretch>
+            <a:fillRect/>
+          </a:stretch>
+        </p:blipFill>
+        <p:spPr bwMode="auto">
+          <a:xfrm>
+            <a:off x="3851920" y="841276"/>
+            <a:ext cx="4464496" cy="4384488"/>
+          </a:xfrm>
+          <a:prstGeom prst="rect">
+            <a:avLst/>
+          </a:prstGeom>
+          <a:noFill/>
+          <a:ln>
+            <a:noFill/>
+          </a:ln>
+          <a:effectLst/>
+          <a:extLst>
+            <a:ext uri="{909E8E84-426E-40DD-AFC4-6F175D3DCCD1}">
+              <a14:hiddenFill xmlns:a14="http://schemas.microsoft.com/office/drawing/2010/main">
+                <a:solidFill>
+                  <a:schemeClr val="accent1"/>
+                </a:solidFill>
+              </a14:hiddenFill>
+            </a:ext>
+            <a:ext uri="{91240B29-F687-4F45-9708-019B960494DF}">
+              <a14:hiddenLine xmlns:a14="http://schemas.microsoft.com/office/drawing/2010/main" w="9525">
+                <a:solidFill>
+                  <a:schemeClr val="tx1"/>
+                </a:solidFill>
+                <a:miter lim="800000"/>
+                <a:headEnd/>
+                <a:tailEnd/>
+              </a14:hiddenLine>
+            </a:ext>
+            <a:ext uri="{AF507438-7753-43E0-B8FC-AC1667EBCBE1}">
+              <a14:hiddenEffects xmlns:a14="http://schemas.microsoft.com/office/drawing/2010/main">
+                <a:effectLst>
+                  <a:outerShdw dist="35921" dir="2700000" algn="ctr" rotWithShape="0">
+                    <a:schemeClr val="bg2"/>
+                  </a:outerShdw>
+                </a:effectLst>
+              </a14:hiddenEffects>
+            </a:ext>
+          </a:extLst>
+        </p:spPr>
+      </p:pic>
+      <p:sp>
+        <p:nvSpPr>
+          <p:cNvPr id="8" name="TextBox 7"/>
+          <p:cNvSpPr txBox="1"/>
+          <p:nvPr/>
+        </p:nvSpPr>
+        <p:spPr>
+          <a:xfrm>
+            <a:off x="463000" y="1845395"/>
+            <a:ext cx="2898576" cy="523220"/>
+          </a:xfrm>
+          <a:prstGeom prst="rect">
+            <a:avLst/>
+          </a:prstGeom>
+          <a:noFill/>
+        </p:spPr>
+        <p:txBody>
+          <a:bodyPr wrap="square" rtlCol="0">
+            <a:spAutoFit/>
+          </a:bodyPr>
+          <a:lstStyle/>
+          <a:p>
+            <a:r>
+              <a:rPr lang="en-US" altLang="ko-KR" sz="1400" dirty="0" smtClean="0">
+                <a:latin typeface="아리따-돋움4.0(OTF)-Medium" pitchFamily="18" charset="-127"/>
+                <a:ea typeface="아리따-돋움4.0(OTF)-Medium" pitchFamily="18" charset="-127"/>
+              </a:rPr>
+              <a:t>“</a:t>
+            </a:r>
+            <a:r>
+              <a:rPr lang="ko-KR" altLang="en-US" sz="1400" dirty="0" smtClean="0">
+                <a:latin typeface="아리따-돋움4.0(OTF)-Medium" pitchFamily="18" charset="-127"/>
+                <a:ea typeface="아리따-돋움4.0(OTF)-Medium" pitchFamily="18" charset="-127"/>
+              </a:rPr>
+              <a:t>사용자들이 직접 원하는 팀을 만들어 </a:t>
+            </a:r>
+            <a:endParaRPr lang="en-US" altLang="ko-KR" sz="1400" dirty="0" smtClean="0">
+              <a:latin typeface="아리따-돋움4.0(OTF)-Medium" pitchFamily="18" charset="-127"/>
+              <a:ea typeface="아리따-돋움4.0(OTF)-Medium" pitchFamily="18" charset="-127"/>
+            </a:endParaRPr>
+          </a:p>
+          <a:p>
+            <a:r>
+              <a:rPr lang="en-US" altLang="ko-KR" sz="1400" dirty="0">
+                <a:solidFill>
+                  <a:srgbClr val="0070C0"/>
+                </a:solidFill>
+                <a:latin typeface="아리따-돋움4.0(OTF)-Medium" pitchFamily="18" charset="-127"/>
+                <a:ea typeface="아리따-돋움4.0(OTF)-Medium" pitchFamily="18" charset="-127"/>
+              </a:rPr>
+              <a:t> </a:t>
+            </a:r>
+            <a:r>
+              <a:rPr lang="ko-KR" altLang="en-US" sz="1400" dirty="0" smtClean="0">
+                <a:solidFill>
+                  <a:srgbClr val="0070C0"/>
+                </a:solidFill>
+                <a:latin typeface="아리따-돋움4.0(OTF)-Medium" pitchFamily="18" charset="-127"/>
+                <a:ea typeface="아리따-돋움4.0(OTF)-Medium" pitchFamily="18" charset="-127"/>
+              </a:rPr>
+              <a:t>모집하고 참여한다</a:t>
+            </a:r>
+            <a:r>
+              <a:rPr lang="en-US" altLang="ko-KR" sz="1400" dirty="0" smtClean="0">
+                <a:latin typeface="아리따-돋움4.0(OTF)-Medium" pitchFamily="18" charset="-127"/>
+                <a:ea typeface="아리따-돋움4.0(OTF)-Medium" pitchFamily="18" charset="-127"/>
+              </a:rPr>
+              <a:t>”</a:t>
+            </a:r>
+          </a:p>
+        </p:txBody>
+      </p:sp>
+      <p:sp>
+        <p:nvSpPr>
+          <p:cNvPr id="9" name="TextBox 8"/>
+          <p:cNvSpPr txBox="1"/>
+          <p:nvPr/>
+        </p:nvSpPr>
+        <p:spPr>
+          <a:xfrm>
+            <a:off x="463000" y="2609051"/>
+            <a:ext cx="3316912" cy="523220"/>
+          </a:xfrm>
+          <a:prstGeom prst="rect">
+            <a:avLst/>
+          </a:prstGeom>
+          <a:noFill/>
+        </p:spPr>
+        <p:txBody>
+          <a:bodyPr wrap="square" rtlCol="0">
+            <a:spAutoFit/>
+          </a:bodyPr>
+          <a:lstStyle/>
+          <a:p>
+            <a:r>
+              <a:rPr lang="en-US" altLang="ko-KR" sz="1400" dirty="0" smtClean="0">
+                <a:latin typeface="아리따-돋움4.0(OTF)-Medium" pitchFamily="18" charset="-127"/>
+                <a:ea typeface="아리따-돋움4.0(OTF)-Medium" pitchFamily="18" charset="-127"/>
+              </a:rPr>
+              <a:t>“</a:t>
+            </a:r>
+            <a:r>
+              <a:rPr lang="ko-KR" altLang="en-US" sz="1400" dirty="0">
+                <a:latin typeface="아리따-돋움4.0(OTF)-Medium" pitchFamily="18" charset="-127"/>
+                <a:ea typeface="아리따-돋움4.0(OTF)-Medium" pitchFamily="18" charset="-127"/>
+              </a:rPr>
+              <a:t>사용자들에게 </a:t>
+            </a:r>
+            <a:r>
+              <a:rPr lang="ko-KR" altLang="en-US" sz="1400" dirty="0" smtClean="0">
+                <a:latin typeface="아리따-돋움4.0(OTF)-Medium" pitchFamily="18" charset="-127"/>
+                <a:ea typeface="아리따-돋움4.0(OTF)-Medium" pitchFamily="18" charset="-127"/>
+              </a:rPr>
+              <a:t>축구와 관련된 </a:t>
+            </a:r>
+            <a:endParaRPr lang="en-US" altLang="ko-KR" sz="1400" dirty="0" smtClean="0">
+              <a:latin typeface="아리따-돋움4.0(OTF)-Medium" pitchFamily="18" charset="-127"/>
+              <a:ea typeface="아리따-돋움4.0(OTF)-Medium" pitchFamily="18" charset="-127"/>
+            </a:endParaRPr>
+          </a:p>
+          <a:p>
+            <a:r>
+              <a:rPr lang="en-US" altLang="ko-KR" sz="1400" dirty="0">
+                <a:latin typeface="아리따-돋움4.0(OTF)-Medium" pitchFamily="18" charset="-127"/>
+                <a:ea typeface="아리따-돋움4.0(OTF)-Medium" pitchFamily="18" charset="-127"/>
+              </a:rPr>
+              <a:t> </a:t>
+            </a:r>
+            <a:r>
+              <a:rPr lang="ko-KR" altLang="en-US" sz="1400" dirty="0" smtClean="0">
+                <a:latin typeface="아리따-돋움4.0(OTF)-Medium" pitchFamily="18" charset="-127"/>
+                <a:ea typeface="아리따-돋움4.0(OTF)-Medium" pitchFamily="18" charset="-127"/>
+              </a:rPr>
+              <a:t>날씨</a:t>
+            </a:r>
+            <a:r>
+              <a:rPr lang="en-US" altLang="ko-KR" sz="1400" dirty="0" smtClean="0">
+                <a:latin typeface="아리따-돋움4.0(OTF)-Medium" pitchFamily="18" charset="-127"/>
+                <a:ea typeface="아리따-돋움4.0(OTF)-Medium" pitchFamily="18" charset="-127"/>
+              </a:rPr>
+              <a:t>, </a:t>
+            </a:r>
+            <a:r>
+              <a:rPr lang="ko-KR" altLang="en-US" sz="1400" dirty="0" smtClean="0">
+                <a:latin typeface="아리따-돋움4.0(OTF)-Medium" pitchFamily="18" charset="-127"/>
+                <a:ea typeface="아리따-돋움4.0(OTF)-Medium" pitchFamily="18" charset="-127"/>
+              </a:rPr>
+              <a:t>영상</a:t>
+            </a:r>
+            <a:r>
+              <a:rPr lang="en-US" altLang="ko-KR" sz="1400" dirty="0" smtClean="0">
+                <a:latin typeface="아리따-돋움4.0(OTF)-Medium" pitchFamily="18" charset="-127"/>
+                <a:ea typeface="아리따-돋움4.0(OTF)-Medium" pitchFamily="18" charset="-127"/>
+              </a:rPr>
+              <a:t>, </a:t>
+            </a:r>
+            <a:r>
+              <a:rPr lang="ko-KR" altLang="en-US" sz="1400" dirty="0" smtClean="0">
+                <a:latin typeface="아리따-돋움4.0(OTF)-Medium" pitchFamily="18" charset="-127"/>
+                <a:ea typeface="아리따-돋움4.0(OTF)-Medium" pitchFamily="18" charset="-127"/>
+              </a:rPr>
+              <a:t>뉴스 </a:t>
+            </a:r>
+            <a:r>
+              <a:rPr lang="ko-KR" altLang="en-US" sz="1400" dirty="0" smtClean="0">
+                <a:solidFill>
+                  <a:srgbClr val="0070C0"/>
+                </a:solidFill>
+                <a:latin typeface="아리따-돋움4.0(OTF)-Medium" pitchFamily="18" charset="-127"/>
+                <a:ea typeface="아리따-돋움4.0(OTF)-Medium" pitchFamily="18" charset="-127"/>
+              </a:rPr>
+              <a:t>정보를 제공</a:t>
+            </a:r>
+            <a:r>
+              <a:rPr lang="ko-KR" altLang="en-US" sz="1400" dirty="0" smtClean="0">
+                <a:latin typeface="아리따-돋움4.0(OTF)-Medium" pitchFamily="18" charset="-127"/>
+                <a:ea typeface="아리따-돋움4.0(OTF)-Medium" pitchFamily="18" charset="-127"/>
+              </a:rPr>
+              <a:t>한다</a:t>
+            </a:r>
+            <a:r>
+              <a:rPr lang="en-US" altLang="ko-KR" sz="1400" dirty="0" smtClean="0">
+                <a:latin typeface="아리따-돋움4.0(OTF)-Medium" pitchFamily="18" charset="-127"/>
+                <a:ea typeface="아리따-돋움4.0(OTF)-Medium" pitchFamily="18" charset="-127"/>
+              </a:rPr>
+              <a:t>”</a:t>
+            </a:r>
+            <a:endParaRPr lang="en-US" altLang="ko-KR" sz="1400" dirty="0" smtClean="0">
+              <a:latin typeface="아리따-돋움4.0(OTF)-Medium" pitchFamily="18" charset="-127"/>
+              <a:ea typeface="아리따-돋움4.0(OTF)-Medium" pitchFamily="18" charset="-127"/>
+            </a:endParaRPr>
+          </a:p>
+        </p:txBody>
+      </p:sp>
+    </p:spTree>
+    <p:extLst>
+      <p:ext uri="{BB962C8B-B14F-4D97-AF65-F5344CB8AC3E}">
+        <p14:creationId xmlns:p14="http://schemas.microsoft.com/office/powerpoint/2010/main" val="3920867977"/>
+      </p:ext>
+    </p:extLst>
+  </p:cSld>
+  <p:clrMapOvr>
+    <a:masterClrMapping/>
+  </p:clrMapOvr>
+</p:sld>
+</file>
+
 <file path=ppt/slides/slide2.xml><?xml version="1.0" encoding="utf-8"?>
 <p:sld xmlns:a="http://schemas.openxmlformats.org/drawingml/2006/main" xmlns:r="http://schemas.openxmlformats.org/officeDocument/2006/relationships" xmlns:p="http://schemas.openxmlformats.org/presentationml/2006/main">
   <p:cSld>
@@ -7375,14 +7771,7 @@
                 <a:latin typeface="아리따-돋움4.0(OTF)-Medium" pitchFamily="18" charset="-127"/>
                 <a:ea typeface="아리따-돋움4.0(OTF)-Medium" pitchFamily="18" charset="-127"/>
               </a:rPr>
-              <a:t>외 </a:t>
-            </a:r>
-            <a:r>
-              <a:rPr lang="ko-KR" altLang="en-US" sz="1400" dirty="0" smtClean="0">
-                <a:latin typeface="아리따-돋움4.0(OTF)-Medium" pitchFamily="18" charset="-127"/>
-                <a:ea typeface="아리따-돋움4.0(OTF)-Medium" pitchFamily="18" charset="-127"/>
-              </a:rPr>
-              <a:t>유명 축구리그</a:t>
+              <a:t>외 유명 축구리그</a:t>
             </a:r>
             <a:endParaRPr lang="en-US" altLang="ko-KR" sz="1400" dirty="0" smtClean="0">
               <a:latin typeface="아리따-돋움4.0(OTF)-Medium" pitchFamily="18" charset="-127"/>
@@ -11090,14 +11479,7 @@
                 <a:latin typeface="아리따-돋움4.0(OTF)-Medium" pitchFamily="18" charset="-127"/>
                 <a:ea typeface="아리따-돋움4.0(OTF)-Medium" pitchFamily="18" charset="-127"/>
               </a:rPr>
-              <a:t>관리자 메일로 내용 </a:t>
-            </a:r>
-            <a:r>
-              <a:rPr lang="ko-KR" altLang="en-US" sz="1200" dirty="0" smtClean="0">
-                <a:latin typeface="아리따-돋움4.0(OTF)-Medium" pitchFamily="18" charset="-127"/>
-                <a:ea typeface="아리따-돋움4.0(OTF)-Medium" pitchFamily="18" charset="-127"/>
-              </a:rPr>
-              <a:t>자동 전송</a:t>
+              <a:t>관리자 메일로 내용 자동 전송</a:t>
             </a:r>
             <a:endParaRPr lang="en-US" altLang="ko-KR" sz="1200" dirty="0" smtClean="0">
               <a:latin typeface="아리따-돋움4.0(OTF)-Medium" pitchFamily="18" charset="-127"/>
@@ -11600,14 +11982,7 @@
                 <a:latin typeface="아리따-돋움4.0(OTF)-Medium" pitchFamily="18" charset="-127"/>
                 <a:ea typeface="아리따-돋움4.0(OTF)-Medium" pitchFamily="18" charset="-127"/>
               </a:rPr>
-              <a:t>마감된 팀에는 </a:t>
-            </a:r>
-            <a:r>
-              <a:rPr lang="ko-KR" altLang="en-US" sz="1200" dirty="0" smtClean="0">
-                <a:latin typeface="아리따-돋움4.0(OTF)-Medium" pitchFamily="18" charset="-127"/>
-                <a:ea typeface="아리따-돋움4.0(OTF)-Medium" pitchFamily="18" charset="-127"/>
-              </a:rPr>
-              <a:t>신청 불가</a:t>
+              <a:t>마감된 팀에는 신청 불가</a:t>
             </a:r>
             <a:endParaRPr lang="en-US" altLang="ko-KR" sz="1200" dirty="0">
               <a:latin typeface="아리따-돋움4.0(OTF)-Medium" pitchFamily="18" charset="-127"/>
@@ -11789,14 +12164,7 @@
                 <a:latin typeface="아리따-돋움4.0(OTF)-Medium" pitchFamily="18" charset="-127"/>
                 <a:ea typeface="아리따-돋움4.0(OTF)-Medium" pitchFamily="18" charset="-127"/>
               </a:rPr>
-              <a:t> </a:t>
-            </a:r>
-            <a:r>
-              <a:rPr lang="en-US" altLang="ko-KR" sz="1200" dirty="0" smtClean="0">
-                <a:latin typeface="아리따-돋움4.0(OTF)-Medium" pitchFamily="18" charset="-127"/>
-                <a:ea typeface="아리따-돋움4.0(OTF)-Medium" pitchFamily="18" charset="-127"/>
-              </a:rPr>
-              <a:t>- </a:t>
+              <a:t> - </a:t>
             </a:r>
             <a:r>
               <a:rPr lang="en-US" altLang="ko-KR" sz="1200" dirty="0" smtClean="0">
@@ -11936,14 +12304,7 @@
                 <a:latin typeface="아리따-돋움4.0(OTF)-Medium" pitchFamily="18" charset="-127"/>
                 <a:ea typeface="아리따-돋움4.0(OTF)-Medium" pitchFamily="18" charset="-127"/>
               </a:rPr>
-              <a:t>시 설정한 옵션들을 </a:t>
-            </a:r>
-            <a:r>
-              <a:rPr lang="ko-KR" altLang="en-US" sz="1200" dirty="0" smtClean="0">
-                <a:latin typeface="아리따-돋움4.0(OTF)-Medium" pitchFamily="18" charset="-127"/>
-                <a:ea typeface="아리따-돋움4.0(OTF)-Medium" pitchFamily="18" charset="-127"/>
-              </a:rPr>
-              <a:t>이미지화</a:t>
+              <a:t>시 설정한 옵션들을 이미지화</a:t>
             </a:r>
             <a:endParaRPr lang="en-US" altLang="ko-KR" sz="1200" dirty="0" smtClean="0">
               <a:latin typeface="아리따-돋움4.0(OTF)-Medium" pitchFamily="18" charset="-127"/>
@@ -12027,14 +12388,7 @@
                 <a:latin typeface="아리따-돋움4.0(OTF)-Medium" pitchFamily="18" charset="-127"/>
                 <a:ea typeface="아리따-돋움4.0(OTF)-Medium" pitchFamily="18" charset="-127"/>
               </a:rPr>
-              <a:t> 팀원으로 </a:t>
-            </a:r>
-            <a:r>
-              <a:rPr lang="ko-KR" altLang="en-US" sz="1200" dirty="0" smtClean="0">
-                <a:latin typeface="아리따-돋움4.0(OTF)-Medium" pitchFamily="18" charset="-127"/>
-                <a:ea typeface="아리따-돋움4.0(OTF)-Medium" pitchFamily="18" charset="-127"/>
-              </a:rPr>
-              <a:t>등록</a:t>
+              <a:t> 팀원으로 등록</a:t>
             </a:r>
             <a:endParaRPr lang="en-US" altLang="ko-KR" sz="1200" dirty="0" smtClean="0">
               <a:latin typeface="아리따-돋움4.0(OTF)-Medium" pitchFamily="18" charset="-127"/>
@@ -12906,14 +13260,7 @@
                 <a:latin typeface="아리따-돋움4.0(OTF)-Medium" pitchFamily="18" charset="-127"/>
                 <a:ea typeface="아리따-돋움4.0(OTF)-Medium" pitchFamily="18" charset="-127"/>
               </a:rPr>
-              <a:t> </a:t>
-            </a:r>
-            <a:r>
-              <a:rPr lang="ko-KR" altLang="en-US" sz="1600" dirty="0" smtClean="0">
-                <a:latin typeface="아리따-돋움4.0(OTF)-Medium" pitchFamily="18" charset="-127"/>
-                <a:ea typeface="아리따-돋움4.0(OTF)-Medium" pitchFamily="18" charset="-127"/>
-              </a:rPr>
-              <a:t>뉴스 페이지</a:t>
+              <a:t> 뉴스 페이지</a:t>
             </a:r>
             <a:endParaRPr lang="ko-KR" altLang="en-US" sz="1600" dirty="0">
               <a:latin typeface="아리따-돋움4.0(OTF)-Medium" pitchFamily="18" charset="-127"/>
@@ -13014,17 +13361,7 @@
                 <a:latin typeface="아리따-돋움4.0(OTF)-Medium" pitchFamily="18" charset="-127"/>
                 <a:ea typeface="아리따-돋움4.0(OTF)-Medium" pitchFamily="18" charset="-127"/>
               </a:rPr>
-              <a:t>News </a:t>
-            </a:r>
-            <a:r>
-              <a:rPr lang="en-US" altLang="ko-KR" sz="1200" dirty="0" smtClean="0">
-                <a:solidFill>
-                  <a:srgbClr val="0070C0"/>
-                </a:solidFill>
-                <a:latin typeface="아리따-돋움4.0(OTF)-Medium" pitchFamily="18" charset="-127"/>
-                <a:ea typeface="아리따-돋움4.0(OTF)-Medium" pitchFamily="18" charset="-127"/>
-              </a:rPr>
-              <a:t>API </a:t>
+              <a:t>News API </a:t>
             </a:r>
             <a:r>
               <a:rPr lang="ko-KR" altLang="en-US" sz="1200" dirty="0" smtClean="0">
@@ -13048,14 +13385,7 @@
                 <a:latin typeface="아리따-돋움4.0(OTF)-Medium" pitchFamily="18" charset="-127"/>
                 <a:ea typeface="아리따-돋움4.0(OTF)-Medium" pitchFamily="18" charset="-127"/>
               </a:rPr>
-              <a:t> </a:t>
-            </a:r>
-            <a:r>
-              <a:rPr lang="ko-KR" altLang="en-US" sz="1200" dirty="0" smtClean="0">
-                <a:latin typeface="아리따-돋움4.0(OTF)-Medium" pitchFamily="18" charset="-127"/>
-                <a:ea typeface="아리따-돋움4.0(OTF)-Medium" pitchFamily="18" charset="-127"/>
-              </a:rPr>
-              <a:t>시즌 </a:t>
+              <a:t> 시즌 </a:t>
             </a:r>
             <a:r>
               <a:rPr lang="en-US" altLang="ko-KR" sz="1200" dirty="0" smtClean="0">
@@ -13635,21 +13965,7 @@
                 <a:latin typeface="아리따-돋움4.0(OTF)-Medium" pitchFamily="18" charset="-127"/>
                 <a:ea typeface="아리따-돋움4.0(OTF)-Medium" pitchFamily="18" charset="-127"/>
               </a:rPr>
-              <a:t> </a:t>
-            </a:r>
-            <a:r>
-              <a:rPr lang="ko-KR" altLang="en-US" sz="1600" dirty="0" smtClean="0">
-                <a:latin typeface="아리따-돋움4.0(OTF)-Medium" pitchFamily="18" charset="-127"/>
-                <a:ea typeface="아리따-돋움4.0(OTF)-Medium" pitchFamily="18" charset="-127"/>
-              </a:rPr>
-              <a:t>영상 </a:t>
-            </a:r>
-            <a:r>
-              <a:rPr lang="ko-KR" altLang="en-US" sz="1600" dirty="0" smtClean="0">
-                <a:latin typeface="아리따-돋움4.0(OTF)-Medium" pitchFamily="18" charset="-127"/>
-                <a:ea typeface="아리따-돋움4.0(OTF)-Medium" pitchFamily="18" charset="-127"/>
-              </a:rPr>
-              <a:t>페이지</a:t>
+              <a:t> 영상 페이지</a:t>
             </a:r>
             <a:endParaRPr lang="ko-KR" altLang="en-US" sz="1600" dirty="0">
               <a:latin typeface="아리따-돋움4.0(OTF)-Medium" pitchFamily="18" charset="-127"/>
@@ -14131,28 +14447,14 @@
                 <a:latin typeface="아리따-돋움4.0(OTF)-Medium" pitchFamily="18" charset="-127"/>
                 <a:ea typeface="아리따-돋움4.0(OTF)-Medium" pitchFamily="18" charset="-127"/>
               </a:rPr>
-              <a:t>Review </a:t>
-            </a:r>
-            <a:r>
-              <a:rPr lang="en-US" altLang="ko-KR" sz="1200" dirty="0" smtClean="0">
-                <a:latin typeface="아리따-돋움4.0(OTF)-Medium" pitchFamily="18" charset="-127"/>
-                <a:ea typeface="아리따-돋움4.0(OTF)-Medium" pitchFamily="18" charset="-127"/>
-              </a:rPr>
-              <a:t>List</a:t>
+              <a:t>Review List</a:t>
             </a:r>
             <a:r>
               <a:rPr lang="ko-KR" altLang="en-US" sz="1200" dirty="0" smtClean="0">
                 <a:latin typeface="아리따-돋움4.0(OTF)-Medium" pitchFamily="18" charset="-127"/>
                 <a:ea typeface="아리따-돋움4.0(OTF)-Medium" pitchFamily="18" charset="-127"/>
               </a:rPr>
-              <a:t>로 이동</a:t>
-            </a:r>
-            <a:r>
-              <a:rPr lang="ko-KR" altLang="en-US" sz="1200" dirty="0" smtClean="0">
-                <a:latin typeface="아리따-돋움4.0(OTF)-Medium" pitchFamily="18" charset="-127"/>
-                <a:ea typeface="아리따-돋움4.0(OTF)-Medium" pitchFamily="18" charset="-127"/>
-              </a:rPr>
-              <a:t> </a:t>
+              <a:t>로 이동 </a:t>
             </a:r>
             <a:endParaRPr lang="en-US" altLang="ko-KR" sz="1200" dirty="0">
               <a:latin typeface="아리따-돋움4.0(OTF)-Medium" pitchFamily="18" charset="-127"/>

</xml_diff>